<commit_message>
Updated some links in the slides. Added a PDF export of slides.
</commit_message>
<xml_diff>
--- a/IADNUG 20150604 Internet of Things NetMF/IoT.pptx
+++ b/IADNUG 20150604 Internet of Things NetMF/IoT.pptx
@@ -1467,7 +1467,7 @@
           <a:bodyPr lIns="0" rIns="0" tIns="0" bIns="0"/>
           <a:p>
             <a:pPr algn="r"/>
-            <a:fld id="{ED9AE3CD-46A3-4A28-8926-12976CBA8FAF}" type="slidenum">
+            <a:fld id="{F64D0706-A1C4-4BB3-B254-B65BC74063ED}" type="slidenum">
               <a:rPr lang="en-US" sz="1400">
                 <a:latin typeface="Times New Roman"/>
               </a:rPr>
@@ -5466,7 +5466,19 @@
               <a:rPr lang="en-US" sz="2800">
                 <a:latin typeface="Arial"/>
               </a:rPr>
-              <a:t>Some Diebold ATMs can flash firmware from a USB stick, allowing arbitrary code to be loaded. </a:t>
+              <a:t>Some </a:t>
+            </a:r>
+            <a:r>
+              <a:rPr lang="en-US" sz="2800">
+                <a:latin typeface="Arial"/>
+              </a:rPr>
+              <a:t>ATM</a:t>
+            </a:r>
+            <a:r>
+              <a:rPr lang="en-US" sz="2800">
+                <a:latin typeface="Arial"/>
+              </a:rPr>
+              <a:t>s can flash firmware from a USB stick, allowing arbitrary code to be loaded. </a:t>
             </a:r>
             <a:endParaRPr/>
           </a:p>
@@ -5480,7 +5492,19 @@
               <a:rPr lang="en-US" sz="2800">
                 <a:latin typeface="Arial"/>
               </a:rPr>
-              <a:t>Medtronic insulin pumps have unprotected wireless interface. An attacker can control all settings, including dosage.</a:t>
+              <a:t>Some </a:t>
+            </a:r>
+            <a:r>
+              <a:rPr lang="en-US" sz="2800">
+                <a:latin typeface="Arial"/>
+              </a:rPr>
+              <a:t>insulin</a:t>
+            </a:r>
+            <a:r>
+              <a:rPr lang="en-US" sz="2800">
+                <a:latin typeface="Arial"/>
+              </a:rPr>
+              <a:t> pumps have unprotected wireless interface. An attacker can control all settings, including dosage.</a:t>
             </a:r>
             <a:endParaRPr/>
           </a:p>
@@ -5494,7 +5518,19 @@
               <a:rPr lang="en-US" sz="2800">
                 <a:latin typeface="Arial"/>
               </a:rPr>
-              <a:t>Vehicles with OnStar can be hacked via the diagnostic port, allowing remote control of throttle, brakes, locks, etc.</a:t>
+              <a:t>Vehicles with </a:t>
+            </a:r>
+            <a:r>
+              <a:rPr lang="en-US" sz="2800">
+                <a:latin typeface="Arial"/>
+              </a:rPr>
+              <a:t>OnStar</a:t>
+            </a:r>
+            <a:r>
+              <a:rPr lang="en-US" sz="2800">
+                <a:latin typeface="Arial"/>
+              </a:rPr>
+              <a:t> can be hacked via the diagnostic port, allowing remote control of throttle, brakes, locks, etc.</a:t>
             </a:r>
             <a:endParaRPr/>
           </a:p>
@@ -7899,7 +7935,7 @@
               <a:rPr lang="en-US" sz="3200">
                 <a:latin typeface="Arial"/>
               </a:rPr>
-              <a:t> Is part of UAP.</a:t>
+              <a:t> Is part of Universal Windows Platform.</a:t>
             </a:r>
             <a:endParaRPr/>
           </a:p>
@@ -7947,6 +7983,32 @@
               <a:rPr lang="en-US" sz="3200">
                 <a:latin typeface="Arial"/>
               </a:rPr>
+              <a:t>Can run on </a:t>
+            </a:r>
+            <a:r>
+              <a:rPr lang="en-US" sz="3200">
+                <a:latin typeface="Arial"/>
+              </a:rPr>
+              <a:t>Raspberry Pi 2</a:t>
+            </a:r>
+            <a:r>
+              <a:rPr lang="en-US" sz="3200">
+                <a:latin typeface="Arial"/>
+              </a:rPr>
+              <a:t> right now, in preview.</a:t>
+            </a:r>
+            <a:endParaRPr/>
+          </a:p>
+          <a:p>
+            <a:pPr>
+              <a:buSzPct val="45000"/>
+              <a:buFont typeface="StarSymbol"/>
+              <a:buChar char=""/>
+            </a:pPr>
+            <a:r>
+              <a:rPr lang="en-US" sz="3200">
+                <a:latin typeface="Arial"/>
+              </a:rPr>
               <a:t>New API</a:t>
             </a:r>
             <a:r>
@@ -7967,7 +8029,7 @@
               <a:rPr lang="en-US" sz="3200">
                 <a:latin typeface="Arial"/>
               </a:rPr>
-              <a:t>Full .NET. Meaning generics, Linq, etc. Anything.</a:t>
+              <a:t>Full .NET capabilities in .NET Core. Meaning generics, Linq, etc. </a:t>
             </a:r>
             <a:endParaRPr/>
           </a:p>
@@ -7987,7 +8049,7 @@
               <a:rPr lang="en-US" sz="3200">
                 <a:latin typeface="Arial"/>
               </a:rPr>
-              <a:t>, continues to exist for smaller devices.</a:t>
+              <a:t>, continues to exist for smaller devices. Not intended to be supplanted by Win10 IoT. </a:t>
             </a:r>
             <a:endParaRPr/>
           </a:p>

</xml_diff>